<commit_message>
made total cost larger
</commit_message>
<xml_diff>
--- a/Jarvis_PowerPoint.pptx
+++ b/Jarvis_PowerPoint.pptx
@@ -109,6 +109,11 @@
       </a:defRPr>
     </a:lvl9pPr>
   </p:defaultTextStyle>
+  <p:extLst>
+    <p:ext uri="{EFAFB233-063F-42B5-8137-9DF3F51BA10A}">
+      <p15:sldGuideLst xmlns:p15="http://schemas.microsoft.com/office/powerpoint/2012/main"/>
+    </p:ext>
+  </p:extLst>
 </p:presentation>
 </file>
 
@@ -259,7 +264,7 @@
           <a:p>
             <a:fld id="{6EDA216C-0E27-47AE-8A46-663B0D894624}" type="datetimeFigureOut">
               <a:rPr lang="en-US" smtClean="0"/>
-              <a:t>5/21/2018</a:t>
+              <a:t>5/22/2018</a:t>
             </a:fld>
             <a:endParaRPr lang="en-US"/>
           </a:p>
@@ -457,7 +462,7 @@
           <a:p>
             <a:fld id="{6EDA216C-0E27-47AE-8A46-663B0D894624}" type="datetimeFigureOut">
               <a:rPr lang="en-US" smtClean="0"/>
-              <a:t>5/21/2018</a:t>
+              <a:t>5/22/2018</a:t>
             </a:fld>
             <a:endParaRPr lang="en-US"/>
           </a:p>
@@ -665,7 +670,7 @@
           <a:p>
             <a:fld id="{6EDA216C-0E27-47AE-8A46-663B0D894624}" type="datetimeFigureOut">
               <a:rPr lang="en-US" smtClean="0"/>
-              <a:t>5/21/2018</a:t>
+              <a:t>5/22/2018</a:t>
             </a:fld>
             <a:endParaRPr lang="en-US"/>
           </a:p>
@@ -863,7 +868,7 @@
           <a:p>
             <a:fld id="{6EDA216C-0E27-47AE-8A46-663B0D894624}" type="datetimeFigureOut">
               <a:rPr lang="en-US" smtClean="0"/>
-              <a:t>5/21/2018</a:t>
+              <a:t>5/22/2018</a:t>
             </a:fld>
             <a:endParaRPr lang="en-US"/>
           </a:p>
@@ -1138,7 +1143,7 @@
           <a:p>
             <a:fld id="{6EDA216C-0E27-47AE-8A46-663B0D894624}" type="datetimeFigureOut">
               <a:rPr lang="en-US" smtClean="0"/>
-              <a:t>5/21/2018</a:t>
+              <a:t>5/22/2018</a:t>
             </a:fld>
             <a:endParaRPr lang="en-US"/>
           </a:p>
@@ -1403,7 +1408,7 @@
           <a:p>
             <a:fld id="{6EDA216C-0E27-47AE-8A46-663B0D894624}" type="datetimeFigureOut">
               <a:rPr lang="en-US" smtClean="0"/>
-              <a:t>5/21/2018</a:t>
+              <a:t>5/22/2018</a:t>
             </a:fld>
             <a:endParaRPr lang="en-US"/>
           </a:p>
@@ -1815,7 +1820,7 @@
           <a:p>
             <a:fld id="{6EDA216C-0E27-47AE-8A46-663B0D894624}" type="datetimeFigureOut">
               <a:rPr lang="en-US" smtClean="0"/>
-              <a:t>5/21/2018</a:t>
+              <a:t>5/22/2018</a:t>
             </a:fld>
             <a:endParaRPr lang="en-US"/>
           </a:p>
@@ -1956,7 +1961,7 @@
           <a:p>
             <a:fld id="{6EDA216C-0E27-47AE-8A46-663B0D894624}" type="datetimeFigureOut">
               <a:rPr lang="en-US" smtClean="0"/>
-              <a:t>5/21/2018</a:t>
+              <a:t>5/22/2018</a:t>
             </a:fld>
             <a:endParaRPr lang="en-US"/>
           </a:p>
@@ -2069,7 +2074,7 @@
           <a:p>
             <a:fld id="{6EDA216C-0E27-47AE-8A46-663B0D894624}" type="datetimeFigureOut">
               <a:rPr lang="en-US" smtClean="0"/>
-              <a:t>5/21/2018</a:t>
+              <a:t>5/22/2018</a:t>
             </a:fld>
             <a:endParaRPr lang="en-US"/>
           </a:p>
@@ -2380,7 +2385,7 @@
           <a:p>
             <a:fld id="{6EDA216C-0E27-47AE-8A46-663B0D894624}" type="datetimeFigureOut">
               <a:rPr lang="en-US" smtClean="0"/>
-              <a:t>5/21/2018</a:t>
+              <a:t>5/22/2018</a:t>
             </a:fld>
             <a:endParaRPr lang="en-US"/>
           </a:p>
@@ -2668,7 +2673,7 @@
           <a:p>
             <a:fld id="{6EDA216C-0E27-47AE-8A46-663B0D894624}" type="datetimeFigureOut">
               <a:rPr lang="en-US" smtClean="0"/>
-              <a:t>5/21/2018</a:t>
+              <a:t>5/22/2018</a:t>
             </a:fld>
             <a:endParaRPr lang="en-US"/>
           </a:p>
@@ -2918,7 +2923,7 @@
           <a:p>
             <a:fld id="{6EDA216C-0E27-47AE-8A46-663B0D894624}" type="datetimeFigureOut">
               <a:rPr lang="en-US" smtClean="0"/>
-              <a:t>5/21/2018</a:t>
+              <a:t>5/22/2018</a:t>
             </a:fld>
             <a:endParaRPr lang="en-US"/>
           </a:p>
@@ -3759,10 +3764,10 @@
       </p:sp>
       <p:pic>
         <p:nvPicPr>
-          <p:cNvPr id="5" name="Picture 4">
-            <a:extLst>
-              <a:ext uri="{FF2B5EF4-FFF2-40B4-BE49-F238E27FC236}">
-                <a16:creationId xmlns:a16="http://schemas.microsoft.com/office/drawing/2014/main" id="{A380B92F-0028-4F08-B8B8-191118929B11}"/>
+          <p:cNvPr id="6" name="Picture 5">
+            <a:extLst>
+              <a:ext uri="{FF2B5EF4-FFF2-40B4-BE49-F238E27FC236}">
+                <a16:creationId xmlns:a16="http://schemas.microsoft.com/office/drawing/2014/main" id="{0802A67F-9984-423E-8FF3-2386E003CADB}"/>
               </a:ext>
             </a:extLst>
           </p:cNvPr>
@@ -3785,8 +3790,8 @@
         </p:blipFill>
         <p:spPr>
           <a:xfrm>
-            <a:off x="6435215" y="3705477"/>
-            <a:ext cx="5527875" cy="2926817"/>
+            <a:off x="6800080" y="183838"/>
+            <a:ext cx="4697331" cy="2914300"/>
           </a:xfrm>
           <a:prstGeom prst="rect">
             <a:avLst/>
@@ -3795,10 +3800,10 @@
       </p:pic>
       <p:pic>
         <p:nvPicPr>
-          <p:cNvPr id="7" name="Picture 6">
-            <a:extLst>
-              <a:ext uri="{FF2B5EF4-FFF2-40B4-BE49-F238E27FC236}">
-                <a16:creationId xmlns:a16="http://schemas.microsoft.com/office/drawing/2014/main" id="{D55C1578-3730-4698-A4FA-98BC9D9DAF51}"/>
+          <p:cNvPr id="9" name="Picture 8">
+            <a:extLst>
+              <a:ext uri="{FF2B5EF4-FFF2-40B4-BE49-F238E27FC236}">
+                <a16:creationId xmlns:a16="http://schemas.microsoft.com/office/drawing/2014/main" id="{38F20B63-D5A1-4747-B866-E114623F9E97}"/>
               </a:ext>
             </a:extLst>
           </p:cNvPr>
@@ -3821,8 +3826,8 @@
         </p:blipFill>
         <p:spPr>
           <a:xfrm>
-            <a:off x="6991109" y="331770"/>
-            <a:ext cx="4362691" cy="3266708"/>
+            <a:off x="6497812" y="3293886"/>
+            <a:ext cx="5301868" cy="3467597"/>
           </a:xfrm>
           <a:prstGeom prst="rect">
             <a:avLst/>

</xml_diff>